<commit_message>
week 1 & small updates
</commit_message>
<xml_diff>
--- a/static/files/SDA/week10/lecture_week_10.pptx
+++ b/static/files/SDA/week10/lecture_week_10.pptx
@@ -237,7 +237,7 @@
           <a:p>
             <a:fld id="{8FEAE804-2177-420F-80EC-8435C849749E}" type="datetimeFigureOut">
               <a:rPr lang="nl-NL" smtClean="0"/>
-              <a:t>31-10-2021</a:t>
+              <a:t>31-08-2022</a:t>
             </a:fld>
             <a:endParaRPr lang="nl-NL"/>
           </a:p>
@@ -859,7 +859,7 @@
           <a:p>
             <a:fld id="{7758815F-D99B-4B41-95A2-A0AEC8FACC43}" type="datetimeFigureOut">
               <a:rPr lang="nl-NL" smtClean="0"/>
-              <a:t>31-10-2021</a:t>
+              <a:t>31-08-2022</a:t>
             </a:fld>
             <a:endParaRPr lang="nl-NL"/>
           </a:p>
@@ -1029,7 +1029,7 @@
           <a:p>
             <a:fld id="{7758815F-D99B-4B41-95A2-A0AEC8FACC43}" type="datetimeFigureOut">
               <a:rPr lang="nl-NL" smtClean="0"/>
-              <a:t>31-10-2021</a:t>
+              <a:t>31-08-2022</a:t>
             </a:fld>
             <a:endParaRPr lang="nl-NL"/>
           </a:p>
@@ -1209,7 +1209,7 @@
           <a:p>
             <a:fld id="{7758815F-D99B-4B41-95A2-A0AEC8FACC43}" type="datetimeFigureOut">
               <a:rPr lang="nl-NL" smtClean="0"/>
-              <a:t>31-10-2021</a:t>
+              <a:t>31-08-2022</a:t>
             </a:fld>
             <a:endParaRPr lang="nl-NL"/>
           </a:p>
@@ -1379,7 +1379,7 @@
           <a:p>
             <a:fld id="{7758815F-D99B-4B41-95A2-A0AEC8FACC43}" type="datetimeFigureOut">
               <a:rPr lang="nl-NL" smtClean="0"/>
-              <a:t>31-10-2021</a:t>
+              <a:t>31-08-2022</a:t>
             </a:fld>
             <a:endParaRPr lang="nl-NL"/>
           </a:p>
@@ -1625,7 +1625,7 @@
           <a:p>
             <a:fld id="{7758815F-D99B-4B41-95A2-A0AEC8FACC43}" type="datetimeFigureOut">
               <a:rPr lang="nl-NL" smtClean="0"/>
-              <a:t>31-10-2021</a:t>
+              <a:t>31-08-2022</a:t>
             </a:fld>
             <a:endParaRPr lang="nl-NL"/>
           </a:p>
@@ -1913,7 +1913,7 @@
           <a:p>
             <a:fld id="{7758815F-D99B-4B41-95A2-A0AEC8FACC43}" type="datetimeFigureOut">
               <a:rPr lang="nl-NL" smtClean="0"/>
-              <a:t>31-10-2021</a:t>
+              <a:t>31-08-2022</a:t>
             </a:fld>
             <a:endParaRPr lang="nl-NL"/>
           </a:p>
@@ -2335,7 +2335,7 @@
           <a:p>
             <a:fld id="{7758815F-D99B-4B41-95A2-A0AEC8FACC43}" type="datetimeFigureOut">
               <a:rPr lang="nl-NL" smtClean="0"/>
-              <a:t>31-10-2021</a:t>
+              <a:t>31-08-2022</a:t>
             </a:fld>
             <a:endParaRPr lang="nl-NL"/>
           </a:p>
@@ -2453,7 +2453,7 @@
           <a:p>
             <a:fld id="{7758815F-D99B-4B41-95A2-A0AEC8FACC43}" type="datetimeFigureOut">
               <a:rPr lang="nl-NL" smtClean="0"/>
-              <a:t>31-10-2021</a:t>
+              <a:t>31-08-2022</a:t>
             </a:fld>
             <a:endParaRPr lang="nl-NL"/>
           </a:p>
@@ -2548,7 +2548,7 @@
           <a:p>
             <a:fld id="{7758815F-D99B-4B41-95A2-A0AEC8FACC43}" type="datetimeFigureOut">
               <a:rPr lang="nl-NL" smtClean="0"/>
-              <a:t>31-10-2021</a:t>
+              <a:t>31-08-2022</a:t>
             </a:fld>
             <a:endParaRPr lang="nl-NL"/>
           </a:p>
@@ -2825,7 +2825,7 @@
           <a:p>
             <a:fld id="{7758815F-D99B-4B41-95A2-A0AEC8FACC43}" type="datetimeFigureOut">
               <a:rPr lang="nl-NL" smtClean="0"/>
-              <a:t>31-10-2021</a:t>
+              <a:t>31-08-2022</a:t>
             </a:fld>
             <a:endParaRPr lang="nl-NL"/>
           </a:p>
@@ -3078,7 +3078,7 @@
           <a:p>
             <a:fld id="{7758815F-D99B-4B41-95A2-A0AEC8FACC43}" type="datetimeFigureOut">
               <a:rPr lang="nl-NL" smtClean="0"/>
-              <a:t>31-10-2021</a:t>
+              <a:t>31-08-2022</a:t>
             </a:fld>
             <a:endParaRPr lang="nl-NL"/>
           </a:p>
@@ -3291,7 +3291,7 @@
           <a:p>
             <a:fld id="{7758815F-D99B-4B41-95A2-A0AEC8FACC43}" type="datetimeFigureOut">
               <a:rPr lang="nl-NL" smtClean="0"/>
-              <a:t>31-10-2021</a:t>
+              <a:t>31-08-2022</a:t>
             </a:fld>
             <a:endParaRPr lang="nl-NL"/>
           </a:p>
@@ -12655,14 +12655,14 @@
           <a:effectLst/>
           <a:extLst>
             <a:ext uri="{909E8E84-426E-40dd-AFC4-6F175D3DCCD1}">
-              <a14:hiddenFill xmlns="" xmlns:a14="http://schemas.microsoft.com/office/drawing/2010/main">
+              <a14:hiddenFill xmlns:a14="http://schemas.microsoft.com/office/drawing/2010/main" xmlns="">
                 <a:solidFill>
                   <a:schemeClr val="accent1"/>
                 </a:solidFill>
               </a14:hiddenFill>
             </a:ext>
             <a:ext uri="{91240B29-F687-4f45-9708-019B960494DF}">
-              <a14:hiddenLine xmlns="" xmlns:a14="http://schemas.microsoft.com/office/drawing/2010/main" w="9525">
+              <a14:hiddenLine xmlns:a14="http://schemas.microsoft.com/office/drawing/2010/main" xmlns="" w="9525">
                 <a:solidFill>
                   <a:schemeClr val="tx1"/>
                 </a:solidFill>
@@ -12672,7 +12672,7 @@
               </a14:hiddenLine>
             </a:ext>
             <a:ext uri="{AF507438-7753-43e0-B8FC-AC1667EBCBE1}">
-              <a14:hiddenEffects xmlns="" xmlns:a14="http://schemas.microsoft.com/office/drawing/2010/main">
+              <a14:hiddenEffects xmlns:a14="http://schemas.microsoft.com/office/drawing/2010/main" xmlns="">
                 <a:effectLst>
                   <a:outerShdw dist="35921" dir="2700000" algn="ctr" rotWithShape="0">
                     <a:schemeClr val="bg2"/>
@@ -13256,14 +13256,14 @@
           <a:effectLst/>
           <a:extLst>
             <a:ext uri="{909E8E84-426E-40dd-AFC4-6F175D3DCCD1}">
-              <a14:hiddenFill xmlns="" xmlns:a14="http://schemas.microsoft.com/office/drawing/2010/main">
+              <a14:hiddenFill xmlns:a14="http://schemas.microsoft.com/office/drawing/2010/main" xmlns="">
                 <a:solidFill>
                   <a:schemeClr val="accent1"/>
                 </a:solidFill>
               </a14:hiddenFill>
             </a:ext>
             <a:ext uri="{91240B29-F687-4f45-9708-019B960494DF}">
-              <a14:hiddenLine xmlns="" xmlns:a14="http://schemas.microsoft.com/office/drawing/2010/main" w="9525">
+              <a14:hiddenLine xmlns:a14="http://schemas.microsoft.com/office/drawing/2010/main" xmlns="" w="9525">
                 <a:solidFill>
                   <a:schemeClr val="tx1"/>
                 </a:solidFill>
@@ -13273,7 +13273,7 @@
               </a14:hiddenLine>
             </a:ext>
             <a:ext uri="{AF507438-7753-43e0-B8FC-AC1667EBCBE1}">
-              <a14:hiddenEffects xmlns="" xmlns:a14="http://schemas.microsoft.com/office/drawing/2010/main">
+              <a14:hiddenEffects xmlns:a14="http://schemas.microsoft.com/office/drawing/2010/main" xmlns="">
                 <a:effectLst>
                   <a:outerShdw dist="35921" dir="2700000" algn="ctr" rotWithShape="0">
                     <a:schemeClr val="bg2"/>
@@ -13604,14 +13604,14 @@
           <a:effectLst/>
           <a:extLst>
             <a:ext uri="{909E8E84-426E-40dd-AFC4-6F175D3DCCD1}">
-              <a14:hiddenFill xmlns="" xmlns:a14="http://schemas.microsoft.com/office/drawing/2010/main">
+              <a14:hiddenFill xmlns:a14="http://schemas.microsoft.com/office/drawing/2010/main" xmlns="">
                 <a:solidFill>
                   <a:schemeClr val="accent1"/>
                 </a:solidFill>
               </a14:hiddenFill>
             </a:ext>
             <a:ext uri="{91240B29-F687-4f45-9708-019B960494DF}">
-              <a14:hiddenLine xmlns="" xmlns:a14="http://schemas.microsoft.com/office/drawing/2010/main" w="9525">
+              <a14:hiddenLine xmlns:a14="http://schemas.microsoft.com/office/drawing/2010/main" xmlns="" w="9525">
                 <a:solidFill>
                   <a:schemeClr val="tx1"/>
                 </a:solidFill>
@@ -13621,7 +13621,7 @@
               </a14:hiddenLine>
             </a:ext>
             <a:ext uri="{AF507438-7753-43e0-B8FC-AC1667EBCBE1}">
-              <a14:hiddenEffects xmlns="" xmlns:a14="http://schemas.microsoft.com/office/drawing/2010/main">
+              <a14:hiddenEffects xmlns:a14="http://schemas.microsoft.com/office/drawing/2010/main" xmlns="">
                 <a:effectLst>
                   <a:outerShdw dist="35921" dir="2700000" algn="ctr" rotWithShape="0">
                     <a:schemeClr val="bg2"/>
@@ -13686,7 +13686,7 @@
           <a:graphicData uri="http://schemas.openxmlformats.org/presentationml/2006/ole">
             <mc:AlternateContent xmlns:mc="http://schemas.openxmlformats.org/markup-compatibility/2006">
               <mc:Choice xmlns:v="urn:schemas-microsoft-com:vml" Requires="v">
-                <p:oleObj spid="_x0000_s2076" name="Formel" r:id="rId3" imgW="1384300" imgH="431800" progId="Equation.3">
+                <p:oleObj spid="_x0000_s2078" name="Formel" r:id="rId3" imgW="1384300" imgH="431800" progId="Equation.3">
                   <p:embed/>
                 </p:oleObj>
               </mc:Choice>
@@ -13725,7 +13725,7 @@
                       <a:noFill/>
                       <a:extLst>
                         <a:ext uri="{909E8E84-426E-40dd-AFC4-6F175D3DCCD1}">
-                          <a14:hiddenFill xmlns="" xmlns:a14="http://schemas.microsoft.com/office/drawing/2010/main">
+                          <a14:hiddenFill xmlns:a14="http://schemas.microsoft.com/office/drawing/2010/main" xmlns="">
                             <a:solidFill>
                               <a:srgbClr val="FFFFFF"/>
                             </a:solidFill>
@@ -13756,7 +13756,7 @@
           <a:graphicData uri="http://schemas.openxmlformats.org/presentationml/2006/ole">
             <mc:AlternateContent xmlns:mc="http://schemas.openxmlformats.org/markup-compatibility/2006">
               <mc:Choice xmlns:v="urn:schemas-microsoft-com:vml" Requires="v">
-                <p:oleObj spid="_x0000_s2077" name="Formel" r:id="rId5" imgW="799753" imgH="444307" progId="Equation.3">
+                <p:oleObj spid="_x0000_s2079" name="Formel" r:id="rId5" imgW="799753" imgH="444307" progId="Equation.3">
                   <p:embed/>
                 </p:oleObj>
               </mc:Choice>
@@ -13795,7 +13795,7 @@
                       <a:noFill/>
                       <a:extLst>
                         <a:ext uri="{909E8E84-426E-40dd-AFC4-6F175D3DCCD1}">
-                          <a14:hiddenFill xmlns="" xmlns:a14="http://schemas.microsoft.com/office/drawing/2010/main">
+                          <a14:hiddenFill xmlns:a14="http://schemas.microsoft.com/office/drawing/2010/main" xmlns="">
                             <a:solidFill>
                               <a:srgbClr val="FFFFFF"/>
                             </a:solidFill>
@@ -15043,14 +15043,14 @@
               </a:ln>
               <a:extLst>
                 <a:ext uri="{909E8E84-426E-40dd-AFC4-6F175D3DCCD1}">
-                  <a14:hiddenFill xmlns="" xmlns:a14="http://schemas.microsoft.com/office/drawing/2010/main">
+                  <a14:hiddenFill xmlns:a14="http://schemas.microsoft.com/office/drawing/2010/main" xmlns="">
                     <a:solidFill>
                       <a:srgbClr val="FFFFFF"/>
                     </a:solidFill>
                   </a14:hiddenFill>
                 </a:ext>
                 <a:ext uri="{91240B29-F687-4f45-9708-019B960494DF}">
-                  <a14:hiddenLine xmlns="" xmlns:a14="http://schemas.microsoft.com/office/drawing/2010/main" w="12700">
+                  <a14:hiddenLine xmlns:a14="http://schemas.microsoft.com/office/drawing/2010/main" xmlns="" w="12700">
                     <a:solidFill>
                       <a:srgbClr val="000000"/>
                     </a:solidFill>
@@ -15207,14 +15207,14 @@
               </a:ln>
               <a:extLst>
                 <a:ext uri="{909E8E84-426E-40dd-AFC4-6F175D3DCCD1}">
-                  <a14:hiddenFill xmlns="" xmlns:a14="http://schemas.microsoft.com/office/drawing/2010/main">
+                  <a14:hiddenFill xmlns:a14="http://schemas.microsoft.com/office/drawing/2010/main" xmlns="">
                     <a:solidFill>
                       <a:srgbClr val="FFFFFF"/>
                     </a:solidFill>
                   </a14:hiddenFill>
                 </a:ext>
                 <a:ext uri="{91240B29-F687-4f45-9708-019B960494DF}">
-                  <a14:hiddenLine xmlns="" xmlns:a14="http://schemas.microsoft.com/office/drawing/2010/main" w="12700">
+                  <a14:hiddenLine xmlns:a14="http://schemas.microsoft.com/office/drawing/2010/main" xmlns="" w="12700">
                     <a:solidFill>
                       <a:srgbClr val="000000"/>
                     </a:solidFill>
@@ -15371,14 +15371,14 @@
               </a:ln>
               <a:extLst>
                 <a:ext uri="{909E8E84-426E-40dd-AFC4-6F175D3DCCD1}">
-                  <a14:hiddenFill xmlns="" xmlns:a14="http://schemas.microsoft.com/office/drawing/2010/main">
+                  <a14:hiddenFill xmlns:a14="http://schemas.microsoft.com/office/drawing/2010/main" xmlns="">
                     <a:solidFill>
                       <a:srgbClr val="FFFFFF"/>
                     </a:solidFill>
                   </a14:hiddenFill>
                 </a:ext>
                 <a:ext uri="{91240B29-F687-4f45-9708-019B960494DF}">
-                  <a14:hiddenLine xmlns="" xmlns:a14="http://schemas.microsoft.com/office/drawing/2010/main" w="12700">
+                  <a14:hiddenLine xmlns:a14="http://schemas.microsoft.com/office/drawing/2010/main" xmlns="" w="12700">
                     <a:solidFill>
                       <a:srgbClr val="000000"/>
                     </a:solidFill>
@@ -15535,14 +15535,14 @@
               </a:ln>
               <a:extLst>
                 <a:ext uri="{909E8E84-426E-40dd-AFC4-6F175D3DCCD1}">
-                  <a14:hiddenFill xmlns="" xmlns:a14="http://schemas.microsoft.com/office/drawing/2010/main">
+                  <a14:hiddenFill xmlns:a14="http://schemas.microsoft.com/office/drawing/2010/main" xmlns="">
                     <a:solidFill>
                       <a:srgbClr val="FFFFFF"/>
                     </a:solidFill>
                   </a14:hiddenFill>
                 </a:ext>
                 <a:ext uri="{91240B29-F687-4f45-9708-019B960494DF}">
-                  <a14:hiddenLine xmlns="" xmlns:a14="http://schemas.microsoft.com/office/drawing/2010/main" w="12700">
+                  <a14:hiddenLine xmlns:a14="http://schemas.microsoft.com/office/drawing/2010/main" xmlns="" w="12700">
                     <a:solidFill>
                       <a:srgbClr val="000000"/>
                     </a:solidFill>
@@ -15704,7 +15704,7 @@
               </a:ln>
               <a:extLst>
                 <a:ext uri="{909E8E84-426E-40dd-AFC4-6F175D3DCCD1}">
-                  <a14:hiddenFill xmlns="" xmlns:a14="http://schemas.microsoft.com/office/drawing/2010/main">
+                  <a14:hiddenFill xmlns:a14="http://schemas.microsoft.com/office/drawing/2010/main" xmlns="">
                     <a:noFill/>
                   </a14:hiddenFill>
                 </a:ext>
@@ -15745,7 +15745,7 @@
               </a:ln>
               <a:extLst>
                 <a:ext uri="{909E8E84-426E-40dd-AFC4-6F175D3DCCD1}">
-                  <a14:hiddenFill xmlns="" xmlns:a14="http://schemas.microsoft.com/office/drawing/2010/main">
+                  <a14:hiddenFill xmlns:a14="http://schemas.microsoft.com/office/drawing/2010/main" xmlns="">
                     <a:noFill/>
                   </a14:hiddenFill>
                 </a:ext>
@@ -15786,7 +15786,7 @@
               </a:ln>
               <a:extLst>
                 <a:ext uri="{909E8E84-426E-40dd-AFC4-6F175D3DCCD1}">
-                  <a14:hiddenFill xmlns="" xmlns:a14="http://schemas.microsoft.com/office/drawing/2010/main">
+                  <a14:hiddenFill xmlns:a14="http://schemas.microsoft.com/office/drawing/2010/main" xmlns="">
                     <a:solidFill>
                       <a:srgbClr val="FFFFFF"/>
                     </a:solidFill>
@@ -15946,7 +15946,7 @@
             </a:ln>
             <a:extLst>
               <a:ext uri="{909E8E84-426E-40dd-AFC4-6F175D3DCCD1}">
-                <a14:hiddenFill xmlns="" xmlns:a14="http://schemas.microsoft.com/office/drawing/2010/main">
+                <a14:hiddenFill xmlns:a14="http://schemas.microsoft.com/office/drawing/2010/main" xmlns="">
                   <a:noFill/>
                 </a14:hiddenFill>
               </a:ext>
@@ -15968,16 +15968,12 @@
             <a:graphicFrameLocks noGrp="1"/>
           </p:cNvGraphicFramePr>
           <p:nvPr>
-            <p:extLst>
-              <p:ext uri="{D42A27DB-BD31-4B8C-83A1-F6EECF244321}">
-                <p14:modId xmlns:p14="http://schemas.microsoft.com/office/powerpoint/2010/main" val="839030352"/>
-              </p:ext>
-            </p:extLst>
+            <p:extLst/>
           </p:nvPr>
         </p:nvGraphicFramePr>
         <p:xfrm>
           <a:off x="457200" y="2558594"/>
-          <a:ext cx="5410200" cy="1651000"/>
+          <a:ext cx="5600699" cy="1651000"/>
         </p:xfrm>
         <a:graphic>
           <a:graphicData uri="http://schemas.openxmlformats.org/drawingml/2006/table">
@@ -15986,21 +15982,21 @@
                 <a:tableStyleId>{5C22544A-7EE6-4342-B048-85BDC9FD1C3A}</a:tableStyleId>
               </a:tblPr>
               <a:tblGrid>
-                <a:gridCol w="1676400">
+                <a:gridCol w="1735428">
                   <a:extLst>
                     <a:ext uri="{9D8B030D-6E8A-4147-A177-3AD203B41FA5}">
                       <a16:colId xmlns:a16="http://schemas.microsoft.com/office/drawing/2014/main" val="20000"/>
                     </a:ext>
                   </a:extLst>
                 </a:gridCol>
-                <a:gridCol w="1828800">
+                <a:gridCol w="1893194">
                   <a:extLst>
                     <a:ext uri="{9D8B030D-6E8A-4147-A177-3AD203B41FA5}">
                       <a16:colId xmlns:a16="http://schemas.microsoft.com/office/drawing/2014/main" val="20001"/>
                     </a:ext>
                   </a:extLst>
                 </a:gridCol>
-                <a:gridCol w="1905000">
+                <a:gridCol w="1972077">
                   <a:extLst>
                     <a:ext uri="{9D8B030D-6E8A-4147-A177-3AD203B41FA5}">
                       <a16:colId xmlns:a16="http://schemas.microsoft.com/office/drawing/2014/main" val="20002"/>
@@ -16026,7 +16022,7 @@
                     <a:p>
                       <a:r>
                         <a:rPr lang="en-US" dirty="0"/>
-                        <a:t>X -&gt; R weak</a:t>
+                        <a:t>X -&gt; Y weak</a:t>
                       </a:r>
                       <a:endParaRPr lang="nl-NL" dirty="0"/>
                     </a:p>
@@ -16040,7 +16036,7 @@
                     <a:p>
                       <a:r>
                         <a:rPr lang="en-US" dirty="0"/>
-                        <a:t>X -&gt; R strong</a:t>
+                        <a:t>X -&gt; Y strong</a:t>
                       </a:r>
                       <a:endParaRPr lang="nl-NL" dirty="0"/>
                     </a:p>
@@ -16065,7 +16061,7 @@
                       </a:r>
                       <a:r>
                         <a:rPr lang="en-US" baseline="0" dirty="0"/>
-                        <a:t> Y      weak</a:t>
+                        <a:t> R      weak</a:t>
                       </a:r>
                       <a:endParaRPr lang="nl-NL" dirty="0"/>
                     </a:p>
@@ -16080,6 +16076,63 @@
                       <a:r>
                         <a:rPr lang="en-US" dirty="0"/>
                         <a:t>Nothing happens</a:t>
+                      </a:r>
+                      <a:endParaRPr lang="nl-NL" dirty="0"/>
+                    </a:p>
+                  </a:txBody>
+                  <a:tcPr/>
+                </a:tc>
+                <a:tc>
+                  <a:txBody>
+                    <a:bodyPr/>
+                    <a:lstStyle/>
+                    <a:p>
+                      <a:r>
+                        <a:rPr lang="nl-NL" dirty="0" err="1"/>
+                        <a:t>Still</a:t>
+                      </a:r>
+                      <a:r>
+                        <a:rPr lang="nl-NL" dirty="0"/>
+                        <a:t> bias</a:t>
+                      </a:r>
+                    </a:p>
+                    <a:p>
+                      <a:r>
+                        <a:rPr lang="nl-NL" dirty="0" err="1"/>
+                        <a:t>Variance</a:t>
+                      </a:r>
+                      <a:r>
+                        <a:rPr lang="nl-NL" dirty="0"/>
+                        <a:t> </a:t>
+                      </a:r>
+                      <a:r>
+                        <a:rPr lang="nl-NL" dirty="0" err="1"/>
+                        <a:t>deflation</a:t>
+                      </a:r>
+                      <a:endParaRPr lang="nl-NL" dirty="0"/>
+                    </a:p>
+                  </a:txBody>
+                  <a:tcPr/>
+                </a:tc>
+                <a:extLst>
+                  <a:ext uri="{0D108BD9-81ED-4DB2-BD59-A6C34878D82A}">
+                    <a16:rowId xmlns:a16="http://schemas.microsoft.com/office/drawing/2014/main" val="10001"/>
+                  </a:ext>
+                </a:extLst>
+              </a:tr>
+              <a:tr h="370840">
+                <a:tc>
+                  <a:txBody>
+                    <a:bodyPr/>
+                    <a:lstStyle/>
+                    <a:p>
+                      <a:r>
+                        <a:rPr lang="en-US" dirty="0"/>
+                        <a:t>X -&gt;</a:t>
+                      </a:r>
+                      <a:r>
+                        <a:rPr lang="en-US" baseline="0" dirty="0"/>
+                        <a:t> R      strong</a:t>
                       </a:r>
                       <a:endParaRPr lang="nl-NL" dirty="0"/>
                     </a:p>
@@ -16110,13 +16163,6 @@
                   </a:txBody>
                   <a:tcPr/>
                 </a:tc>
-                <a:extLst>
-                  <a:ext uri="{0D108BD9-81ED-4DB2-BD59-A6C34878D82A}">
-                    <a16:rowId xmlns:a16="http://schemas.microsoft.com/office/drawing/2014/main" val="10001"/>
-                  </a:ext>
-                </a:extLst>
-              </a:tr>
-              <a:tr h="370840">
                 <a:tc>
                   <a:txBody>
                     <a:bodyPr/>
@@ -16124,44 +16170,13 @@
                     <a:p>
                       <a:r>
                         <a:rPr lang="en-US" dirty="0"/>
-                        <a:t>X -&gt;</a:t>
-                      </a:r>
-                      <a:r>
-                        <a:rPr lang="en-US" baseline="0" dirty="0"/>
-                        <a:t> Y      strong</a:t>
-                      </a:r>
-                      <a:endParaRPr lang="nl-NL" dirty="0"/>
-                    </a:p>
-                  </a:txBody>
-                  <a:tcPr/>
-                </a:tc>
-                <a:tc>
-                  <a:txBody>
-                    <a:bodyPr/>
-                    <a:lstStyle/>
-                    <a:p>
-                      <a:r>
-                        <a:rPr lang="en-US" dirty="0"/>
-                        <a:t>Bias somewhat reduced</a:t>
-                      </a:r>
-                    </a:p>
-                  </a:txBody>
-                  <a:tcPr/>
-                </a:tc>
-                <a:tc>
-                  <a:txBody>
-                    <a:bodyPr/>
-                    <a:lstStyle/>
-                    <a:p>
-                      <a:r>
-                        <a:rPr lang="en-US" dirty="0"/>
-                        <a:t>Bias reduced</a:t>
+                        <a:t>Bias reduction</a:t>
                       </a:r>
                     </a:p>
                     <a:p>
                       <a:r>
                         <a:rPr lang="en-US" dirty="0"/>
-                        <a:t>Variance inflation</a:t>
+                        <a:t>Variance reduction</a:t>
                       </a:r>
                       <a:endParaRPr lang="nl-NL" dirty="0"/>
                     </a:p>
@@ -16181,7 +16196,7 @@
     </p:spTree>
     <p:extLst>
       <p:ext uri="{BB962C8B-B14F-4D97-AF65-F5344CB8AC3E}">
-        <p14:creationId xmlns:p14="http://schemas.microsoft.com/office/powerpoint/2010/main" val="2139214988"/>
+        <p14:creationId xmlns:p14="http://schemas.microsoft.com/office/powerpoint/2010/main" val="4000253229"/>
       </p:ext>
     </p:extLst>
   </p:cSld>

</xml_diff>